<commit_message>
create main.html and Sitemap.xml
</commit_message>
<xml_diff>
--- a/Курсовая Лушкин.pptx
+++ b/Курсовая Лушкин.pptx
@@ -5,7 +5,7 @@
     <p:sldMasterId id="2147483786" r:id="rId1"/>
   </p:sldMasterIdLst>
   <p:notesMasterIdLst>
-    <p:notesMasterId r:id="rId10"/>
+    <p:notesMasterId r:id="rId11"/>
   </p:notesMasterIdLst>
   <p:sldIdLst>
     <p:sldId id="256" r:id="rId2"/>
@@ -14,8 +14,9 @@
     <p:sldId id="259" r:id="rId5"/>
     <p:sldId id="262" r:id="rId6"/>
     <p:sldId id="263" r:id="rId7"/>
-    <p:sldId id="261" r:id="rId8"/>
-    <p:sldId id="264" r:id="rId9"/>
+    <p:sldId id="265" r:id="rId8"/>
+    <p:sldId id="261" r:id="rId9"/>
+    <p:sldId id="264" r:id="rId10"/>
   </p:sldIdLst>
   <p:sldSz cx="12192000" cy="6858000"/>
   <p:notesSz cx="6858000" cy="9144000"/>
@@ -204,7 +205,7 @@
           <a:p>
             <a:fld id="{145C7316-6A37-43C4-B34C-ECF67CC32D4A}" type="datetimeFigureOut">
               <a:rPr lang="ru-RU" smtClean="0"/>
-              <a:t>19.01.2024</a:t>
+              <a:t>26.01.2024</a:t>
             </a:fld>
             <a:endParaRPr lang="ru-RU"/>
           </a:p>
@@ -536,7 +537,7 @@
           <a:p>
             <a:fld id="{6CF8CDFF-2D3C-44C7-991E-2ED053AE701A}" type="slidenum">
               <a:rPr lang="ru-RU" smtClean="0"/>
-              <a:t>8</a:t>
+              <a:t>9</a:t>
             </a:fld>
             <a:endParaRPr lang="ru-RU"/>
           </a:p>
@@ -694,7 +695,7 @@
           <a:p>
             <a:fld id="{7C195675-4DB2-450C-979C-BE2915670A51}" type="datetimeFigureOut">
               <a:rPr lang="ru-RU" smtClean="0"/>
-              <a:t>19.01.2024</a:t>
+              <a:t>26.01.2024</a:t>
             </a:fld>
             <a:endParaRPr lang="ru-RU"/>
           </a:p>
@@ -905,7 +906,7 @@
           <a:p>
             <a:fld id="{7C195675-4DB2-450C-979C-BE2915670A51}" type="datetimeFigureOut">
               <a:rPr lang="ru-RU" smtClean="0"/>
-              <a:t>19.01.2024</a:t>
+              <a:t>26.01.2024</a:t>
             </a:fld>
             <a:endParaRPr lang="ru-RU"/>
           </a:p>
@@ -1120,7 +1121,7 @@
           <a:p>
             <a:fld id="{7C195675-4DB2-450C-979C-BE2915670A51}" type="datetimeFigureOut">
               <a:rPr lang="ru-RU" smtClean="0"/>
-              <a:t>19.01.2024</a:t>
+              <a:t>26.01.2024</a:t>
             </a:fld>
             <a:endParaRPr lang="ru-RU"/>
           </a:p>
@@ -1321,7 +1322,7 @@
           <a:p>
             <a:fld id="{7C195675-4DB2-450C-979C-BE2915670A51}" type="datetimeFigureOut">
               <a:rPr lang="ru-RU" smtClean="0"/>
-              <a:t>19.01.2024</a:t>
+              <a:t>26.01.2024</a:t>
             </a:fld>
             <a:endParaRPr lang="ru-RU"/>
           </a:p>
@@ -1600,7 +1601,7 @@
           <a:p>
             <a:fld id="{7C195675-4DB2-450C-979C-BE2915670A51}" type="datetimeFigureOut">
               <a:rPr lang="ru-RU" smtClean="0"/>
-              <a:t>19.01.2024</a:t>
+              <a:t>26.01.2024</a:t>
             </a:fld>
             <a:endParaRPr lang="ru-RU"/>
           </a:p>
@@ -1868,7 +1869,7 @@
           <a:p>
             <a:fld id="{7C195675-4DB2-450C-979C-BE2915670A51}" type="datetimeFigureOut">
               <a:rPr lang="ru-RU" smtClean="0"/>
-              <a:t>19.01.2024</a:t>
+              <a:t>26.01.2024</a:t>
             </a:fld>
             <a:endParaRPr lang="ru-RU"/>
           </a:p>
@@ -2284,7 +2285,7 @@
           <a:p>
             <a:fld id="{7C195675-4DB2-450C-979C-BE2915670A51}" type="datetimeFigureOut">
               <a:rPr lang="ru-RU" smtClean="0"/>
-              <a:t>19.01.2024</a:t>
+              <a:t>26.01.2024</a:t>
             </a:fld>
             <a:endParaRPr lang="ru-RU"/>
           </a:p>
@@ -2433,7 +2434,7 @@
           <a:p>
             <a:fld id="{7C195675-4DB2-450C-979C-BE2915670A51}" type="datetimeFigureOut">
               <a:rPr lang="ru-RU" smtClean="0"/>
-              <a:t>19.01.2024</a:t>
+              <a:t>26.01.2024</a:t>
             </a:fld>
             <a:endParaRPr lang="ru-RU"/>
           </a:p>
@@ -2559,7 +2560,7 @@
           <a:p>
             <a:fld id="{7C195675-4DB2-450C-979C-BE2915670A51}" type="datetimeFigureOut">
               <a:rPr lang="ru-RU" smtClean="0"/>
-              <a:t>19.01.2024</a:t>
+              <a:t>26.01.2024</a:t>
             </a:fld>
             <a:endParaRPr lang="ru-RU"/>
           </a:p>
@@ -2810,7 +2811,7 @@
           <a:p>
             <a:fld id="{7C195675-4DB2-450C-979C-BE2915670A51}" type="datetimeFigureOut">
               <a:rPr lang="ru-RU" smtClean="0"/>
-              <a:t>19.01.2024</a:t>
+              <a:t>26.01.2024</a:t>
             </a:fld>
             <a:endParaRPr lang="ru-RU"/>
           </a:p>
@@ -3255,7 +3256,7 @@
           <a:p>
             <a:fld id="{7C195675-4DB2-450C-979C-BE2915670A51}" type="datetimeFigureOut">
               <a:rPr lang="ru-RU" smtClean="0"/>
-              <a:t>19.01.2024</a:t>
+              <a:t>26.01.2024</a:t>
             </a:fld>
             <a:endParaRPr lang="ru-RU"/>
           </a:p>
@@ -3581,7 +3582,7 @@
           <a:p>
             <a:fld id="{7C195675-4DB2-450C-979C-BE2915670A51}" type="datetimeFigureOut">
               <a:rPr lang="ru-RU" smtClean="0"/>
-              <a:t>19.01.2024</a:t>
+              <a:t>26.01.2024</a:t>
             </a:fld>
             <a:endParaRPr lang="ru-RU"/>
           </a:p>
@@ -4095,7 +4096,7 @@
                 <a:latin typeface="Times New Roman" panose="02020603050405020304" pitchFamily="18" charset="0"/>
                 <a:cs typeface="Times New Roman" panose="02020603050405020304" pitchFamily="18" charset="0"/>
               </a:rPr>
-              <a:t>КУРСРОВАЯ РАБОТА</a:t>
+              <a:t>КУРСОВАЯ РАБОТА</a:t>
             </a:r>
           </a:p>
         </p:txBody>
@@ -4217,7 +4218,7 @@
         <p:spPr/>
         <p:txBody>
           <a:bodyPr>
-            <a:normAutofit fontScale="77500" lnSpcReduction="20000"/>
+            <a:normAutofit fontScale="70000" lnSpcReduction="20000"/>
           </a:bodyPr>
           <a:lstStyle/>
           <a:p>
@@ -4235,17 +4236,20 @@
           <a:p>
             <a:pPr lvl="0"/>
             <a:r>
-              <a:rPr lang="ru-RU" dirty="0"/>
-              <a:t>Разработать систему корзины и оформления заказа, которая будет интуитивно понятной и удобной для пользователей.</a:t>
-            </a:r>
-          </a:p>
-          <a:p>
-            <a:r>
               <a:rPr lang="ru-RU" dirty="0">
                 <a:latin typeface="Times New Roman" panose="02020603050405020304" pitchFamily="18" charset="0"/>
                 <a:cs typeface="Times New Roman" panose="02020603050405020304" pitchFamily="18" charset="0"/>
               </a:rPr>
-              <a:t>Предоставить подробную информацию о каждом продукте, включая его описание, фотографии, цены, ингредиенты и пищевую ценность.</a:t>
+              <a:t>Разработка сайта магазина продуктов питания с интерактивной витриной прайсом и возможностью выбора товара.</a:t>
+            </a:r>
+          </a:p>
+          <a:p>
+            <a:r>
+              <a:rPr lang="ru-RU" dirty="0">
+                <a:latin typeface="Times New Roman" panose="02020603050405020304" pitchFamily="18" charset="0"/>
+                <a:cs typeface="Times New Roman" panose="02020603050405020304" pitchFamily="18" charset="0"/>
+              </a:rPr>
+              <a:t>Предоставление подробной информации о каждом товаре, включая его состав, пищевую ценность, дату изготовления, срок годности и другую релевантную информацию, чтобы пользователи могли принимать информированные решения при покупке.</a:t>
             </a:r>
           </a:p>
           <a:p>
@@ -4261,46 +4265,36 @@
             </a:r>
           </a:p>
           <a:p>
-            <a:pPr lvl="0"/>
             <a:r>
               <a:rPr lang="ru-RU" dirty="0">
                 <a:latin typeface="Times New Roman" panose="02020603050405020304" pitchFamily="18" charset="0"/>
                 <a:cs typeface="Times New Roman" panose="02020603050405020304" pitchFamily="18" charset="0"/>
               </a:rPr>
-              <a:t>Аналитика и проектирование.</a:t>
-            </a:r>
-          </a:p>
-          <a:p>
-            <a:pPr lvl="0"/>
+              <a:t>Создание удобного и интуитивно понятного интерфейса для пользователей, чтобы они могли легко находить нужные продукты и осуществлять покупки без лишних сложностей.</a:t>
+            </a:r>
+          </a:p>
+          <a:p>
             <a:r>
               <a:rPr lang="ru-RU" dirty="0">
                 <a:latin typeface="Times New Roman" panose="02020603050405020304" pitchFamily="18" charset="0"/>
                 <a:cs typeface="Times New Roman" panose="02020603050405020304" pitchFamily="18" charset="0"/>
               </a:rPr>
-              <a:t>Сбор и обработка входящих требований, аналитика. </a:t>
-            </a:r>
-          </a:p>
-          <a:p>
-            <a:pPr lvl="0"/>
+              <a:t>Разработать систему корзины и оформления заказа, которая будет интуитивно понятной и удобной для пользователей.</a:t>
+            </a:r>
+          </a:p>
+          <a:p>
             <a:r>
               <a:rPr lang="ru-RU" dirty="0">
                 <a:latin typeface="Times New Roman" panose="02020603050405020304" pitchFamily="18" charset="0"/>
                 <a:cs typeface="Times New Roman" panose="02020603050405020304" pitchFamily="18" charset="0"/>
               </a:rPr>
-              <a:t>Проектирование ключевых страниц сайта. </a:t>
-            </a:r>
-          </a:p>
-          <a:p>
-            <a:pPr lvl="0"/>
-            <a:r>
-              <a:rPr lang="ru-RU" dirty="0">
-                <a:latin typeface="Times New Roman" panose="02020603050405020304" pitchFamily="18" charset="0"/>
-                <a:cs typeface="Times New Roman" panose="02020603050405020304" pitchFamily="18" charset="0"/>
-              </a:rPr>
-              <a:t>Разработка дизайн-концепции сайта на примере главной и внутренних страниц.</a:t>
-            </a:r>
-          </a:p>
-          <a:p>
+              <a:t>Интеграция с социальными сетями и другими онлайн-платформами, чтобы пользователи могли легко поделиться ссылками на интересные продукты с друзьями и следить за новостями магазина.</a:t>
+            </a:r>
+          </a:p>
+          <a:p>
+            <a:pPr marL="0" indent="0">
+              <a:buNone/>
+            </a:pPr>
             <a:endParaRPr lang="ru-RU" dirty="0"/>
           </a:p>
         </p:txBody>
@@ -4495,21 +4489,7 @@
                 <a:latin typeface="Times New Roman" panose="02020603050405020304" pitchFamily="18" charset="0"/>
                 <a:cs typeface="Times New Roman" panose="02020603050405020304" pitchFamily="18" charset="0"/>
               </a:rPr>
-              <a:t>»). </a:t>
-            </a:r>
-            <a:r>
-              <a:rPr lang="ru-RU" dirty="0" err="1">
-                <a:latin typeface="Times New Roman" panose="02020603050405020304" pitchFamily="18" charset="0"/>
-                <a:cs typeface="Times New Roman" panose="02020603050405020304" pitchFamily="18" charset="0"/>
-              </a:rPr>
-              <a:t>Мультипарадигменный</a:t>
-            </a:r>
-            <a:r>
-              <a:rPr lang="ru-RU" dirty="0">
-                <a:latin typeface="Times New Roman" panose="02020603050405020304" pitchFamily="18" charset="0"/>
-                <a:cs typeface="Times New Roman" panose="02020603050405020304" pitchFamily="18" charset="0"/>
-              </a:rPr>
-              <a:t> язык программирования. </a:t>
+              <a:t>»). Мультипарадигменный язык программирования. </a:t>
             </a:r>
             <a:r>
               <a:rPr lang="ru-RU" dirty="0" err="1">
@@ -4905,10 +4885,10 @@
       </p:sp>
       <p:pic>
         <p:nvPicPr>
-          <p:cNvPr id="7" name="Объект 6">
+          <p:cNvPr id="9" name="Объект 8">
             <a:extLst>
               <a:ext uri="{FF2B5EF4-FFF2-40B4-BE49-F238E27FC236}">
-                <a16:creationId xmlns:a16="http://schemas.microsoft.com/office/drawing/2014/main" id="{979DD737-DBE0-4768-8ABB-EC4710B22A52}"/>
+                <a16:creationId xmlns:a16="http://schemas.microsoft.com/office/drawing/2014/main" id="{32ADA0F2-2817-4B76-9665-01FFC30D700F}"/>
               </a:ext>
             </a:extLst>
           </p:cNvPr>
@@ -4933,8 +4913,8 @@
         </p:blipFill>
         <p:spPr>
           <a:xfrm>
-            <a:off x="845031" y="2011363"/>
-            <a:ext cx="5249928" cy="4668217"/>
+            <a:off x="452717" y="2011363"/>
+            <a:ext cx="5643283" cy="4661867"/>
           </a:xfrm>
           <a:prstGeom prst="rect">
             <a:avLst/>
@@ -4943,10 +4923,10 @@
       </p:pic>
       <p:pic>
         <p:nvPicPr>
-          <p:cNvPr id="8" name="Объект 7">
+          <p:cNvPr id="11" name="Объект 10">
             <a:extLst>
               <a:ext uri="{FF2B5EF4-FFF2-40B4-BE49-F238E27FC236}">
-                <a16:creationId xmlns:a16="http://schemas.microsoft.com/office/drawing/2014/main" id="{C71769C1-6CE0-4D52-A489-402DB02E5F57}"/>
+                <a16:creationId xmlns:a16="http://schemas.microsoft.com/office/drawing/2014/main" id="{BDA007C8-9495-4428-8C41-E1DCC17B11AC}"/>
               </a:ext>
             </a:extLst>
           </p:cNvPr>
@@ -4971,8 +4951,8 @@
         </p:blipFill>
         <p:spPr>
           <a:xfrm>
-            <a:off x="6258181" y="2011363"/>
-            <a:ext cx="4796671" cy="4661867"/>
+            <a:off x="6314889" y="2011362"/>
+            <a:ext cx="5643283" cy="4661867"/>
           </a:xfrm>
           <a:prstGeom prst="rect">
             <a:avLst/>
@@ -5014,7 +4994,7 @@
           <p:cNvPr id="2" name="Заголовок 1">
             <a:extLst>
               <a:ext uri="{FF2B5EF4-FFF2-40B4-BE49-F238E27FC236}">
-                <a16:creationId xmlns:a16="http://schemas.microsoft.com/office/drawing/2014/main" id="{67759503-27C6-4A8C-93E1-7352CAA57FBD}"/>
+                <a16:creationId xmlns:a16="http://schemas.microsoft.com/office/drawing/2014/main" id="{1C753AFC-29EE-4ED9-AF4E-7F11634A4959}"/>
               </a:ext>
             </a:extLst>
           </p:cNvPr>
@@ -5035,48 +5015,91 @@
                 <a:latin typeface="Times New Roman" panose="02020603050405020304" pitchFamily="18" charset="0"/>
                 <a:cs typeface="Times New Roman" panose="02020603050405020304" pitchFamily="18" charset="0"/>
               </a:rPr>
-              <a:t>Заключение</a:t>
-            </a:r>
-          </a:p>
-        </p:txBody>
-      </p:sp>
-      <p:sp>
-        <p:nvSpPr>
-          <p:cNvPr id="3" name="Объект 2">
+              <a:t>Контакты</a:t>
+            </a:r>
+          </a:p>
+        </p:txBody>
+      </p:sp>
+      <p:pic>
+        <p:nvPicPr>
+          <p:cNvPr id="8" name="Объект 7">
             <a:extLst>
               <a:ext uri="{FF2B5EF4-FFF2-40B4-BE49-F238E27FC236}">
-                <a16:creationId xmlns:a16="http://schemas.microsoft.com/office/drawing/2014/main" id="{E5C76C26-9E67-4527-81D4-A2388C0D7D43}"/>
+                <a16:creationId xmlns:a16="http://schemas.microsoft.com/office/drawing/2014/main" id="{9DE573BA-6946-4C98-B1EE-E72DEE452711}"/>
               </a:ext>
             </a:extLst>
           </p:cNvPr>
-          <p:cNvSpPr>
-            <a:spLocks noGrp="1"/>
-          </p:cNvSpPr>
-          <p:nvPr>
-            <p:ph idx="1"/>
-          </p:nvPr>
-        </p:nvSpPr>
-        <p:spPr/>
-        <p:txBody>
-          <a:bodyPr>
-            <a:normAutofit fontScale="92500" lnSpcReduction="20000"/>
-          </a:bodyPr>
-          <a:lstStyle/>
-          <a:p>
-            <a:r>
-              <a:rPr lang="ru-RU" dirty="0">
-                <a:latin typeface="Times New Roman" panose="02020603050405020304" pitchFamily="18" charset="0"/>
-                <a:cs typeface="Times New Roman" panose="02020603050405020304" pitchFamily="18" charset="0"/>
-              </a:rPr>
-              <a:t>В заключении следует отметить, что в нашем современном обществе Интернет играет невероятно важную роль, особенно в сфере торговли. С увеличением спроса на онлайн-покупки становится все более необходимо создание и поддержка высококачественных веб-сайтов для продуктовых магазинов. В данном исследовании мы предлагаем владельцам продуктовых магазинов и разработчикам веб-сайтов ознакомиться с основными методами и технологиями, необходимыми для успешного онлайн-присутствия. Глубокое понимание преимуществ и недостатков онлайн-продаж позволит предпринимателям оптимизировать свой бизнес и предоставить своим клиентам максимальное удобство и доступность через интернет. В результате, разработка качественного веб-сайта для продуктового магазина является одним из ключевых факторов успеха и процветания бизнеса в современном мире.</a:t>
-            </a:r>
-          </a:p>
-        </p:txBody>
-      </p:sp>
+          <p:cNvPicPr>
+            <a:picLocks noGrp="1"/>
+          </p:cNvPicPr>
+          <p:nvPr>
+            <p:ph sz="half" idx="1"/>
+          </p:nvPr>
+        </p:nvPicPr>
+        <p:blipFill>
+          <a:blip r:embed="rId2">
+            <a:extLst>
+              <a:ext uri="{28A0092B-C50C-407E-A947-70E740481C1C}">
+                <a14:useLocalDpi xmlns:a14="http://schemas.microsoft.com/office/drawing/2010/main" val="0"/>
+              </a:ext>
+            </a:extLst>
+          </a:blip>
+          <a:stretch>
+            <a:fillRect/>
+          </a:stretch>
+        </p:blipFill>
+        <p:spPr>
+          <a:xfrm>
+            <a:off x="268941" y="2017343"/>
+            <a:ext cx="5825301" cy="4293810"/>
+          </a:xfrm>
+          <a:prstGeom prst="rect">
+            <a:avLst/>
+          </a:prstGeom>
+        </p:spPr>
+      </p:pic>
+      <p:pic>
+        <p:nvPicPr>
+          <p:cNvPr id="9" name="Объект 8">
+            <a:extLst>
+              <a:ext uri="{FF2B5EF4-FFF2-40B4-BE49-F238E27FC236}">
+                <a16:creationId xmlns:a16="http://schemas.microsoft.com/office/drawing/2014/main" id="{D2152A48-C3B0-4D1D-8620-296130A1F0C6}"/>
+              </a:ext>
+            </a:extLst>
+          </p:cNvPr>
+          <p:cNvPicPr>
+            <a:picLocks noGrp="1"/>
+          </p:cNvPicPr>
+          <p:nvPr>
+            <p:ph sz="half" idx="2"/>
+          </p:nvPr>
+        </p:nvPicPr>
+        <p:blipFill>
+          <a:blip r:embed="rId3">
+            <a:extLst>
+              <a:ext uri="{28A0092B-C50C-407E-A947-70E740481C1C}">
+                <a14:useLocalDpi xmlns:a14="http://schemas.microsoft.com/office/drawing/2010/main" val="0"/>
+              </a:ext>
+            </a:extLst>
+          </a:blip>
+          <a:stretch>
+            <a:fillRect/>
+          </a:stretch>
+        </p:blipFill>
+        <p:spPr>
+          <a:xfrm>
+            <a:off x="6409827" y="2017343"/>
+            <a:ext cx="5575985" cy="4293810"/>
+          </a:xfrm>
+          <a:prstGeom prst="rect">
+            <a:avLst/>
+          </a:prstGeom>
+        </p:spPr>
+      </p:pic>
     </p:spTree>
     <p:extLst>
       <p:ext uri="{BB962C8B-B14F-4D97-AF65-F5344CB8AC3E}">
-        <p14:creationId xmlns:p14="http://schemas.microsoft.com/office/powerpoint/2010/main" val="1282468332"/>
+        <p14:creationId xmlns:p14="http://schemas.microsoft.com/office/powerpoint/2010/main" val="736766922"/>
       </p:ext>
     </p:extLst>
   </p:cSld>
@@ -5108,6 +5131,115 @@
           <p:cNvPr id="2" name="Заголовок 1">
             <a:extLst>
               <a:ext uri="{FF2B5EF4-FFF2-40B4-BE49-F238E27FC236}">
+                <a16:creationId xmlns:a16="http://schemas.microsoft.com/office/drawing/2014/main" id="{67759503-27C6-4A8C-93E1-7352CAA57FBD}"/>
+              </a:ext>
+            </a:extLst>
+          </p:cNvPr>
+          <p:cNvSpPr>
+            <a:spLocks noGrp="1"/>
+          </p:cNvSpPr>
+          <p:nvPr>
+            <p:ph type="title"/>
+          </p:nvPr>
+        </p:nvSpPr>
+        <p:spPr/>
+        <p:txBody>
+          <a:bodyPr/>
+          <a:lstStyle/>
+          <a:p>
+            <a:r>
+              <a:rPr lang="ru-RU" cap="none" dirty="0">
+                <a:latin typeface="Times New Roman" panose="02020603050405020304" pitchFamily="18" charset="0"/>
+                <a:cs typeface="Times New Roman" panose="02020603050405020304" pitchFamily="18" charset="0"/>
+              </a:rPr>
+              <a:t>Заключение</a:t>
+            </a:r>
+          </a:p>
+        </p:txBody>
+      </p:sp>
+      <p:sp>
+        <p:nvSpPr>
+          <p:cNvPr id="3" name="Объект 2">
+            <a:extLst>
+              <a:ext uri="{FF2B5EF4-FFF2-40B4-BE49-F238E27FC236}">
+                <a16:creationId xmlns:a16="http://schemas.microsoft.com/office/drawing/2014/main" id="{E5C76C26-9E67-4527-81D4-A2388C0D7D43}"/>
+              </a:ext>
+            </a:extLst>
+          </p:cNvPr>
+          <p:cNvSpPr>
+            <a:spLocks noGrp="1"/>
+          </p:cNvSpPr>
+          <p:nvPr>
+            <p:ph idx="1"/>
+          </p:nvPr>
+        </p:nvSpPr>
+        <p:spPr/>
+        <p:txBody>
+          <a:bodyPr>
+            <a:normAutofit fontScale="92500"/>
+          </a:bodyPr>
+          <a:lstStyle/>
+          <a:p>
+            <a:r>
+              <a:rPr lang="ru-RU" sz="1600" dirty="0">
+                <a:latin typeface="Times New Roman" panose="02020603050405020304" pitchFamily="18" charset="0"/>
+                <a:cs typeface="Times New Roman" panose="02020603050405020304" pitchFamily="18" charset="0"/>
+              </a:rPr>
+              <a:t>Таким образом, разработка уникального и индивидуального веб-сайта для продуктового магазина является необходимостью в современном бизнесе. Он должен предоставлять уникальное пользовательское впечатление, подчеркивать уникальность продуктов и бренда магазина, а также обеспечивать удобство и доступность для клиентов. Уникальность веб-сайта может быть достигнута через сочетание оригинального дизайна, инновационных функций и удобного интерфейса. Кроме того, веб-сайт должен содержать информацию о товарах, включая подробные описания, фотографии и впечатления других покупателей. Для достижения успеха необходимо учесть специфику продуктового магазина и правильно реализовать ключевые компоненты веб-сайта. Например, система оформления заказов и доставки должна быть простой и удобной, позволяющей клиентам легко совершить покупку и получить товары в кратчайшие сроки. Онлайн-присутствие продуктового магазина имеет множество преимуществ, включая возможность совершать покупки в удобное время, широкий выбор товаров и конкурентные цены. Веб-сайт помогает привлечь новых клиентов и удержать существующих, делая покупки максимально удобными и доступными.</a:t>
+            </a:r>
+          </a:p>
+          <a:p>
+            <a:endParaRPr lang="ru-RU" sz="1400" dirty="0">
+              <a:latin typeface="Times New Roman" panose="02020603050405020304" pitchFamily="18" charset="0"/>
+              <a:cs typeface="Times New Roman" panose="02020603050405020304" pitchFamily="18" charset="0"/>
+            </a:endParaRPr>
+          </a:p>
+          <a:p>
+            <a:endParaRPr lang="ru-RU" sz="1400" dirty="0">
+              <a:latin typeface="Times New Roman" panose="02020603050405020304" pitchFamily="18" charset="0"/>
+              <a:cs typeface="Times New Roman" panose="02020603050405020304" pitchFamily="18" charset="0"/>
+            </a:endParaRPr>
+          </a:p>
+          <a:p>
+            <a:endParaRPr lang="ru-RU" dirty="0"/>
+          </a:p>
+        </p:txBody>
+      </p:sp>
+    </p:spTree>
+    <p:extLst>
+      <p:ext uri="{BB962C8B-B14F-4D97-AF65-F5344CB8AC3E}">
+        <p14:creationId xmlns:p14="http://schemas.microsoft.com/office/powerpoint/2010/main" val="1282468332"/>
+      </p:ext>
+    </p:extLst>
+  </p:cSld>
+  <p:clrMapOvr>
+    <a:masterClrMapping/>
+  </p:clrMapOvr>
+</p:sld>
+</file>
+
+<file path=ppt/slides/slide9.xml><?xml version="1.0" encoding="utf-8"?>
+<p:sld xmlns:a="http://schemas.openxmlformats.org/drawingml/2006/main" xmlns:r="http://schemas.openxmlformats.org/officeDocument/2006/relationships" xmlns:p="http://schemas.openxmlformats.org/presentationml/2006/main">
+  <p:cSld>
+    <p:spTree>
+      <p:nvGrpSpPr>
+        <p:cNvPr id="1" name=""/>
+        <p:cNvGrpSpPr/>
+        <p:nvPr/>
+      </p:nvGrpSpPr>
+      <p:grpSpPr>
+        <a:xfrm>
+          <a:off x="0" y="0"/>
+          <a:ext cx="0" cy="0"/>
+          <a:chOff x="0" y="0"/>
+          <a:chExt cx="0" cy="0"/>
+        </a:xfrm>
+      </p:grpSpPr>
+      <p:sp>
+        <p:nvSpPr>
+          <p:cNvPr id="2" name="Заголовок 1">
+            <a:extLst>
+              <a:ext uri="{FF2B5EF4-FFF2-40B4-BE49-F238E27FC236}">
                 <a16:creationId xmlns:a16="http://schemas.microsoft.com/office/drawing/2014/main" id="{0B2BDF9D-A1C5-4B8C-B0CB-4DA7508BBC07}"/>
               </a:ext>
             </a:extLst>
@@ -5152,6 +5284,23 @@
         <p:txBody>
           <a:bodyPr/>
           <a:lstStyle/>
+          <a:p>
+            <a:pPr marL="0" indent="0" algn="ctr">
+              <a:buNone/>
+            </a:pPr>
+            <a:r>
+              <a:rPr lang="ru-RU">
+                <a:latin typeface="Times New Roman" panose="02020603050405020304" pitchFamily="18" charset="0"/>
+                <a:cs typeface="Times New Roman" panose="02020603050405020304" pitchFamily="18" charset="0"/>
+                <a:hlinkClick r:id="rId3"/>
+              </a:rPr>
+              <a:t>Чайка</a:t>
+            </a:r>
+            <a:endParaRPr lang="ru-RU" dirty="0">
+              <a:latin typeface="Times New Roman" panose="02020603050405020304" pitchFamily="18" charset="0"/>
+              <a:cs typeface="Times New Roman" panose="02020603050405020304" pitchFamily="18" charset="0"/>
+            </a:endParaRPr>
+          </a:p>
           <a:p>
             <a:pPr marL="0" indent="0" algn="ctr">
               <a:buNone/>

</xml_diff>